<commit_message>
PDFs to send, missing dossier pro
</commit_message>
<xml_diff>
--- a/presentation_en.pptx
+++ b/presentation_en.pptx
@@ -119,6 +119,11 @@
       </a:defRPr>
     </a:lvl9pPr>
   </p:defaultTextStyle>
+  <p:extLst>
+    <p:ext uri="{EFAFB233-063F-42B5-8137-9DF3F51BA10A}">
+      <p15:sldGuideLst xmlns:p15="http://schemas.microsoft.com/office/powerpoint/2012/main"/>
+    </p:ext>
+  </p:extLst>
 </p:presentation>
 </file>
 
@@ -5257,13 +5262,8 @@
           <a:p>
             <a:r>
               <a:rPr lang="en-US" dirty="0"/>
-              <a:t>Component-based </a:t>
-            </a:r>
-            <a:r>
-              <a:rPr lang="en-US" dirty="0" err="1"/>
-              <a:t>architercture</a:t>
-            </a:r>
-            <a:endParaRPr lang="en-US" dirty="0"/>
+              <a:t>Component-based architecture</a:t>
+            </a:r>
           </a:p>
           <a:p>
             <a:r>
@@ -5472,7 +5472,7 @@
             <a:pPr lvl="1"/>
             <a:r>
               <a:rPr lang="en-US" dirty="0"/>
-              <a:t>Tables  of users, photos, likes, categories, </a:t>
+              <a:t>Tables of users, photos, likes, categories, </a:t>
             </a:r>
             <a:r>
               <a:rPr lang="en-US" dirty="0" err="1"/>

</xml_diff>